<commit_message>
Musical notes and Presentation update
Title
</commit_message>
<xml_diff>
--- a/Presentations/presentation_02.pptx
+++ b/Presentations/presentation_02.pptx
@@ -7,19 +7,21 @@
   <p:sldIdLst>
     <p:sldId id="256" r:id="rId2"/>
     <p:sldId id="268" r:id="rId3"/>
-    <p:sldId id="274" r:id="rId4"/>
-    <p:sldId id="269" r:id="rId5"/>
-    <p:sldId id="270" r:id="rId6"/>
-    <p:sldId id="275" r:id="rId7"/>
-    <p:sldId id="276" r:id="rId8"/>
-    <p:sldId id="280" r:id="rId9"/>
-    <p:sldId id="278" r:id="rId10"/>
-    <p:sldId id="281" r:id="rId11"/>
-    <p:sldId id="282" r:id="rId12"/>
-    <p:sldId id="283" r:id="rId13"/>
-    <p:sldId id="284" r:id="rId14"/>
-    <p:sldId id="277" r:id="rId15"/>
-    <p:sldId id="279" r:id="rId16"/>
+    <p:sldId id="270" r:id="rId4"/>
+    <p:sldId id="285" r:id="rId5"/>
+    <p:sldId id="274" r:id="rId6"/>
+    <p:sldId id="269" r:id="rId7"/>
+    <p:sldId id="275" r:id="rId8"/>
+    <p:sldId id="276" r:id="rId9"/>
+    <p:sldId id="280" r:id="rId10"/>
+    <p:sldId id="278" r:id="rId11"/>
+    <p:sldId id="281" r:id="rId12"/>
+    <p:sldId id="282" r:id="rId13"/>
+    <p:sldId id="283" r:id="rId14"/>
+    <p:sldId id="284" r:id="rId15"/>
+    <p:sldId id="277" r:id="rId16"/>
+    <p:sldId id="279" r:id="rId17"/>
+    <p:sldId id="286" r:id="rId18"/>
   </p:sldIdLst>
   <p:sldSz cx="12192000" cy="6858000"/>
   <p:notesSz cx="6858000" cy="9144000"/>
@@ -221,7 +223,7 @@
           <a:effectLst/>
           <a:extLst>
             <a:ext uri="{91240B29-F687-4f45-9708-019B960494DF}">
-              <a14:hiddenLine xmlns:a14="http://schemas.microsoft.com/office/drawing/2010/main" xmlns="" w="9525">
+              <a14:hiddenLine xmlns="" xmlns:a14="http://schemas.microsoft.com/office/drawing/2010/main" w="9525">
                 <a:solidFill>
                   <a:srgbClr val="000000"/>
                 </a:solidFill>
@@ -1748,7 +1750,7 @@
           <a:ln/>
           <a:extLst>
             <a:ext uri="{91240B29-F687-4f45-9708-019B960494DF}">
-              <a14:hiddenLine xmlns:a14="http://schemas.microsoft.com/office/drawing/2010/main" xmlns="" w="9525">
+              <a14:hiddenLine xmlns="" xmlns:a14="http://schemas.microsoft.com/office/drawing/2010/main" w="9525">
                 <a:solidFill>
                   <a:srgbClr val="000000"/>
                 </a:solidFill>
@@ -2023,7 +2025,7 @@
           <a:ln/>
           <a:extLst>
             <a:ext uri="{91240B29-F687-4f45-9708-019B960494DF}">
-              <a14:hiddenLine xmlns:a14="http://schemas.microsoft.com/office/drawing/2010/main" xmlns="" w="9525">
+              <a14:hiddenLine xmlns="" xmlns:a14="http://schemas.microsoft.com/office/drawing/2010/main" w="9525">
                 <a:solidFill>
                   <a:srgbClr val="000000"/>
                 </a:solidFill>
@@ -2311,7 +2313,7 @@
           <a:ln/>
           <a:extLst>
             <a:ext uri="{91240B29-F687-4f45-9708-019B960494DF}">
-              <a14:hiddenLine xmlns:a14="http://schemas.microsoft.com/office/drawing/2010/main" xmlns="" w="9525">
+              <a14:hiddenLine xmlns="" xmlns:a14="http://schemas.microsoft.com/office/drawing/2010/main" w="9525">
                 <a:solidFill>
                   <a:srgbClr val="000000"/>
                 </a:solidFill>
@@ -2942,7 +2944,7 @@
           <a:ln/>
           <a:extLst>
             <a:ext uri="{91240B29-F687-4f45-9708-019B960494DF}">
-              <a14:hiddenLine xmlns:a14="http://schemas.microsoft.com/office/drawing/2010/main" xmlns="" w="9525">
+              <a14:hiddenLine xmlns="" xmlns:a14="http://schemas.microsoft.com/office/drawing/2010/main" w="9525">
                 <a:solidFill>
                   <a:srgbClr val="000000"/>
                 </a:solidFill>
@@ -3281,7 +3283,7 @@
           <a:ln/>
           <a:extLst>
             <a:ext uri="{91240B29-F687-4f45-9708-019B960494DF}">
-              <a14:hiddenLine xmlns:a14="http://schemas.microsoft.com/office/drawing/2010/main" xmlns="" w="9525">
+              <a14:hiddenLine xmlns="" xmlns:a14="http://schemas.microsoft.com/office/drawing/2010/main" w="9525">
                 <a:solidFill>
                   <a:srgbClr val="000000"/>
                 </a:solidFill>
@@ -3758,7 +3760,7 @@
           <a:ln/>
           <a:extLst>
             <a:ext uri="{91240B29-F687-4f45-9708-019B960494DF}">
-              <a14:hiddenLine xmlns:a14="http://schemas.microsoft.com/office/drawing/2010/main" xmlns="" w="9525">
+              <a14:hiddenLine xmlns="" xmlns:a14="http://schemas.microsoft.com/office/drawing/2010/main" w="9525">
                 <a:solidFill>
                   <a:srgbClr val="000000"/>
                 </a:solidFill>
@@ -4187,7 +4189,7 @@
           <a:ln/>
           <a:extLst>
             <a:ext uri="{91240B29-F687-4f45-9708-019B960494DF}">
-              <a14:hiddenLine xmlns:a14="http://schemas.microsoft.com/office/drawing/2010/main" xmlns="" w="9525">
+              <a14:hiddenLine xmlns="" xmlns:a14="http://schemas.microsoft.com/office/drawing/2010/main" w="9525">
                 <a:solidFill>
                   <a:srgbClr val="000000"/>
                 </a:solidFill>
@@ -5398,7 +5400,7 @@
       </a:lvl9pPr>
     </p:otherStyle>
   </p:txStyles>
-  <p:extLst>
+  <p:extLst mod="1">
     <p:ext uri="{27BBF7A9-308A-43DC-89C8-2F10F3537804}">
       <p15:sldGuideLst xmlns:p15="http://schemas.microsoft.com/office/powerpoint/2012/main"/>
     </p:ext>
@@ -5498,6 +5500,129 @@
 </file>
 
 <file path=ppt/slides/slide10.xml><?xml version="1.0" encoding="utf-8"?>
+<p:sld xmlns:a="http://schemas.openxmlformats.org/drawingml/2006/main" xmlns:r="http://schemas.openxmlformats.org/officeDocument/2006/relationships" xmlns:p="http://schemas.openxmlformats.org/presentationml/2006/main">
+  <p:cSld>
+    <p:spTree>
+      <p:nvGrpSpPr>
+        <p:cNvPr id="1" name=""/>
+        <p:cNvGrpSpPr/>
+        <p:nvPr/>
+      </p:nvGrpSpPr>
+      <p:grpSpPr>
+        <a:xfrm>
+          <a:off x="0" y="0"/>
+          <a:ext cx="0" cy="0"/>
+          <a:chOff x="0" y="0"/>
+          <a:chExt cx="0" cy="0"/>
+        </a:xfrm>
+      </p:grpSpPr>
+      <p:sp>
+        <p:nvSpPr>
+          <p:cNvPr id="2" name="Title 1">
+            <a:extLst>
+              <a:ext uri="{FF2B5EF4-FFF2-40B4-BE49-F238E27FC236}">
+                <a16:creationId xmlns:a16="http://schemas.microsoft.com/office/drawing/2014/main" id="{4E6D46AD-2146-4D3E-93C5-CA4A3AC61AB3}"/>
+              </a:ext>
+            </a:extLst>
+          </p:cNvPr>
+          <p:cNvSpPr>
+            <a:spLocks noGrp="1"/>
+          </p:cNvSpPr>
+          <p:nvPr>
+            <p:ph type="title"/>
+          </p:nvPr>
+        </p:nvSpPr>
+        <p:spPr/>
+        <p:txBody>
+          <a:bodyPr/>
+          <a:lstStyle/>
+          <a:p>
+            <a:r>
+              <a:rPr lang="en-GB" dirty="0"/>
+              <a:t>Keeping your pet happy</a:t>
+            </a:r>
+          </a:p>
+        </p:txBody>
+      </p:sp>
+      <p:sp>
+        <p:nvSpPr>
+          <p:cNvPr id="3" name="Content Placeholder 2">
+            <a:extLst>
+              <a:ext uri="{FF2B5EF4-FFF2-40B4-BE49-F238E27FC236}">
+                <a16:creationId xmlns:a16="http://schemas.microsoft.com/office/drawing/2014/main" id="{752B7FC2-BF01-41B5-845F-65A516ADECBA}"/>
+              </a:ext>
+            </a:extLst>
+          </p:cNvPr>
+          <p:cNvSpPr>
+            <a:spLocks noGrp="1"/>
+          </p:cNvSpPr>
+          <p:nvPr>
+            <p:ph idx="1"/>
+          </p:nvPr>
+        </p:nvSpPr>
+        <p:spPr>
+          <a:xfrm>
+            <a:off x="818712" y="2486981"/>
+            <a:ext cx="10554574" cy="3636511"/>
+          </a:xfrm>
+        </p:spPr>
+        <p:txBody>
+          <a:bodyPr>
+            <a:noAutofit/>
+          </a:bodyPr>
+          <a:lstStyle/>
+          <a:p>
+            <a:r>
+              <a:rPr lang="en-GB" sz="2800" b="1" dirty="0"/>
+              <a:t>Food will never decrease mood</a:t>
+            </a:r>
+          </a:p>
+          <a:p>
+            <a:pPr lvl="1"/>
+            <a:r>
+              <a:rPr lang="en-GB" sz="2800" b="1" dirty="0"/>
+              <a:t>Favourite fruit Increases mood a lot</a:t>
+            </a:r>
+          </a:p>
+          <a:p>
+            <a:pPr lvl="1"/>
+            <a:r>
+              <a:rPr lang="en-GB" sz="2800" b="1" dirty="0"/>
+              <a:t>Non-Preference fruit increases mood a little</a:t>
+            </a:r>
+          </a:p>
+          <a:p>
+            <a:pPr lvl="1"/>
+            <a:r>
+              <a:rPr lang="en-GB" sz="2800" b="1" dirty="0"/>
+              <a:t>Disliked fruit will not increase the mood</a:t>
+            </a:r>
+          </a:p>
+          <a:p>
+            <a:endParaRPr lang="en-GB" sz="2800" b="1" dirty="0"/>
+          </a:p>
+          <a:p>
+            <a:r>
+              <a:rPr lang="en-GB" sz="2800" b="1" dirty="0"/>
+              <a:t>Plan to add interaction such as petting/brushing/playing with them</a:t>
+            </a:r>
+          </a:p>
+        </p:txBody>
+      </p:sp>
+    </p:spTree>
+    <p:extLst>
+      <p:ext uri="{BB962C8B-B14F-4D97-AF65-F5344CB8AC3E}">
+        <p14:creationId xmlns:p14="http://schemas.microsoft.com/office/powerpoint/2010/main" val="1809592591"/>
+      </p:ext>
+    </p:extLst>
+  </p:cSld>
+  <p:clrMapOvr>
+    <a:masterClrMapping/>
+  </p:clrMapOvr>
+</p:sld>
+</file>
+
+<file path=ppt/slides/slide11.xml><?xml version="1.0" encoding="utf-8"?>
 <p:sld xmlns:a="http://schemas.openxmlformats.org/drawingml/2006/main" xmlns:r="http://schemas.openxmlformats.org/officeDocument/2006/relationships" xmlns:p="http://schemas.openxmlformats.org/presentationml/2006/main">
   <p:cSld>
     <p:spTree>
@@ -5638,7 +5763,7 @@
 </p:sld>
 </file>
 
-<file path=ppt/slides/slide11.xml><?xml version="1.0" encoding="utf-8"?>
+<file path=ppt/slides/slide12.xml><?xml version="1.0" encoding="utf-8"?>
 <p:sld xmlns:a="http://schemas.openxmlformats.org/drawingml/2006/main" xmlns:r="http://schemas.openxmlformats.org/officeDocument/2006/relationships" xmlns:p="http://schemas.openxmlformats.org/presentationml/2006/main">
   <p:cSld>
     <p:spTree>
@@ -5767,113 +5892,6 @@
 </p:sld>
 </file>
 
-<file path=ppt/slides/slide12.xml><?xml version="1.0" encoding="utf-8"?>
-<p:sld xmlns:a="http://schemas.openxmlformats.org/drawingml/2006/main" xmlns:r="http://schemas.openxmlformats.org/officeDocument/2006/relationships" xmlns:p="http://schemas.openxmlformats.org/presentationml/2006/main">
-  <p:cSld>
-    <p:spTree>
-      <p:nvGrpSpPr>
-        <p:cNvPr id="1" name=""/>
-        <p:cNvGrpSpPr/>
-        <p:nvPr/>
-      </p:nvGrpSpPr>
-      <p:grpSpPr>
-        <a:xfrm>
-          <a:off x="0" y="0"/>
-          <a:ext cx="0" cy="0"/>
-          <a:chOff x="0" y="0"/>
-          <a:chExt cx="0" cy="0"/>
-        </a:xfrm>
-      </p:grpSpPr>
-      <p:sp>
-        <p:nvSpPr>
-          <p:cNvPr id="2" name="Title 1">
-            <a:extLst>
-              <a:ext uri="{FF2B5EF4-FFF2-40B4-BE49-F238E27FC236}">
-                <a16:creationId xmlns:a16="http://schemas.microsoft.com/office/drawing/2014/main" id="{D191BA72-5E30-41E6-82F5-894AEE2F7350}"/>
-              </a:ext>
-            </a:extLst>
-          </p:cNvPr>
-          <p:cNvSpPr>
-            <a:spLocks noGrp="1"/>
-          </p:cNvSpPr>
-          <p:nvPr>
-            <p:ph type="title"/>
-          </p:nvPr>
-        </p:nvSpPr>
-        <p:spPr/>
-        <p:txBody>
-          <a:bodyPr/>
-          <a:lstStyle/>
-          <a:p>
-            <a:r>
-              <a:rPr lang="en-GB" dirty="0"/>
-              <a:t>Meaningful Decisions</a:t>
-            </a:r>
-          </a:p>
-        </p:txBody>
-      </p:sp>
-      <p:sp>
-        <p:nvSpPr>
-          <p:cNvPr id="8" name="Content Placeholder 7">
-            <a:extLst>
-              <a:ext uri="{FF2B5EF4-FFF2-40B4-BE49-F238E27FC236}">
-                <a16:creationId xmlns:a16="http://schemas.microsoft.com/office/drawing/2014/main" id="{3368C05B-99E8-4EC9-A5FF-922BB3B33A11}"/>
-              </a:ext>
-            </a:extLst>
-          </p:cNvPr>
-          <p:cNvSpPr>
-            <a:spLocks noGrp="1"/>
-          </p:cNvSpPr>
-          <p:nvPr>
-            <p:ph idx="1"/>
-          </p:nvPr>
-        </p:nvSpPr>
-        <p:spPr/>
-        <p:txBody>
-          <a:bodyPr/>
-          <a:lstStyle/>
-          <a:p>
-            <a:r>
-              <a:rPr lang="en-GB" sz="2800" b="1" dirty="0"/>
-              <a:t>Each Fruit affects one STAT massively and another minorly</a:t>
-            </a:r>
-          </a:p>
-          <a:p>
-            <a:r>
-              <a:rPr lang="en-GB" sz="2800" b="1" dirty="0"/>
-              <a:t>There 3 Tree Spaces</a:t>
-            </a:r>
-          </a:p>
-          <a:p>
-            <a:r>
-              <a:rPr lang="en-GB" sz="2800" b="1" dirty="0"/>
-              <a:t>Players can rapidly increase 3 STATS at a time</a:t>
-            </a:r>
-          </a:p>
-          <a:p>
-            <a:r>
-              <a:rPr lang="en-GB" sz="2800" b="1" dirty="0"/>
-              <a:t>If each tree is different, all STATs can be raised</a:t>
-            </a:r>
-          </a:p>
-          <a:p>
-            <a:endParaRPr lang="en-GB" dirty="0"/>
-          </a:p>
-        </p:txBody>
-      </p:sp>
-    </p:spTree>
-    <p:extLst>
-      <p:ext uri="{BB962C8B-B14F-4D97-AF65-F5344CB8AC3E}">
-        <p14:creationId xmlns:p14="http://schemas.microsoft.com/office/powerpoint/2010/main" val="3002931078"/>
-      </p:ext>
-    </p:extLst>
-  </p:cSld>
-  <p:clrMapOvr>
-    <a:masterClrMapping/>
-  </p:clrMapOvr>
-</p:sld>
-</file>
-
 <file path=ppt/slides/slide13.xml><?xml version="1.0" encoding="utf-8"?>
 <p:sld xmlns:a="http://schemas.openxmlformats.org/drawingml/2006/main" xmlns:r="http://schemas.openxmlformats.org/officeDocument/2006/relationships" xmlns:p="http://schemas.openxmlformats.org/presentationml/2006/main">
   <p:cSld>
@@ -5896,7 +5914,7 @@
           <p:cNvPr id="2" name="Title 1">
             <a:extLst>
               <a:ext uri="{FF2B5EF4-FFF2-40B4-BE49-F238E27FC236}">
-                <a16:creationId xmlns:a16="http://schemas.microsoft.com/office/drawing/2014/main" id="{DC20CC1C-0923-4C36-AF2A-AC80AEF6A378}"/>
+                <a16:creationId xmlns:a16="http://schemas.microsoft.com/office/drawing/2014/main" id="{D191BA72-5E30-41E6-82F5-894AEE2F7350}"/>
               </a:ext>
             </a:extLst>
           </p:cNvPr>
@@ -5914,17 +5932,17 @@
           <a:p>
             <a:r>
               <a:rPr lang="en-GB" dirty="0"/>
-              <a:t>Fruitful Choice</a:t>
-            </a:r>
-          </a:p>
-        </p:txBody>
-      </p:sp>
-      <p:sp>
-        <p:nvSpPr>
-          <p:cNvPr id="3" name="Content Placeholder 2">
+              <a:t>Meaningful Decisions</a:t>
+            </a:r>
+          </a:p>
+        </p:txBody>
+      </p:sp>
+      <p:sp>
+        <p:nvSpPr>
+          <p:cNvPr id="8" name="Content Placeholder 7">
             <a:extLst>
               <a:ext uri="{FF2B5EF4-FFF2-40B4-BE49-F238E27FC236}">
-                <a16:creationId xmlns:a16="http://schemas.microsoft.com/office/drawing/2014/main" id="{9AEAA405-CD15-479B-AA6A-536BFCC35EDC}"/>
+                <a16:creationId xmlns:a16="http://schemas.microsoft.com/office/drawing/2014/main" id="{3368C05B-99E8-4EC9-A5FF-922BB3B33A11}"/>
               </a:ext>
             </a:extLst>
           </p:cNvPr>
@@ -5940,44 +5958,38 @@
           <a:bodyPr/>
           <a:lstStyle/>
           <a:p>
-            <a:endParaRPr lang="en-GB"/>
-          </a:p>
-        </p:txBody>
-      </p:sp>
-      <p:pic>
-        <p:nvPicPr>
-          <p:cNvPr id="4" name="Picture 3">
-            <a:extLst>
-              <a:ext uri="{FF2B5EF4-FFF2-40B4-BE49-F238E27FC236}">
-                <a16:creationId xmlns:a16="http://schemas.microsoft.com/office/drawing/2014/main" id="{91492980-55E8-4D27-9B81-C79295572738}"/>
-              </a:ext>
-            </a:extLst>
-          </p:cNvPr>
-          <p:cNvPicPr>
-            <a:picLocks noChangeAspect="1"/>
-          </p:cNvPicPr>
-          <p:nvPr/>
-        </p:nvPicPr>
-        <p:blipFill>
-          <a:blip r:embed="rId2"/>
-          <a:stretch>
-            <a:fillRect/>
-          </a:stretch>
-        </p:blipFill>
-        <p:spPr>
-          <a:xfrm>
-            <a:off x="2029308" y="2789695"/>
-            <a:ext cx="8133384" cy="2741590"/>
-          </a:xfrm>
-          <a:prstGeom prst="rect">
-            <a:avLst/>
-          </a:prstGeom>
-        </p:spPr>
-      </p:pic>
+            <a:r>
+              <a:rPr lang="en-GB" sz="2800" b="1" dirty="0"/>
+              <a:t>Each Fruit affects one STAT massively and another minorly</a:t>
+            </a:r>
+          </a:p>
+          <a:p>
+            <a:r>
+              <a:rPr lang="en-GB" sz="2800" b="1" dirty="0"/>
+              <a:t>There 3 Tree Spaces</a:t>
+            </a:r>
+          </a:p>
+          <a:p>
+            <a:r>
+              <a:rPr lang="en-GB" sz="2800" b="1" dirty="0"/>
+              <a:t>Players can rapidly increase 3 STATS at a time</a:t>
+            </a:r>
+          </a:p>
+          <a:p>
+            <a:r>
+              <a:rPr lang="en-GB" sz="2800" b="1" dirty="0"/>
+              <a:t>If each tree is different, all STATs can be raised</a:t>
+            </a:r>
+          </a:p>
+          <a:p>
+            <a:endParaRPr lang="en-GB" dirty="0"/>
+          </a:p>
+        </p:txBody>
+      </p:sp>
     </p:spTree>
     <p:extLst>
       <p:ext uri="{BB962C8B-B14F-4D97-AF65-F5344CB8AC3E}">
-        <p14:creationId xmlns:p14="http://schemas.microsoft.com/office/powerpoint/2010/main" val="1391785033"/>
+        <p14:creationId xmlns:p14="http://schemas.microsoft.com/office/powerpoint/2010/main" val="3002931078"/>
       </p:ext>
     </p:extLst>
   </p:cSld>
@@ -6009,6 +6021,129 @@
           <p:cNvPr id="2" name="Title 1">
             <a:extLst>
               <a:ext uri="{FF2B5EF4-FFF2-40B4-BE49-F238E27FC236}">
+                <a16:creationId xmlns:a16="http://schemas.microsoft.com/office/drawing/2014/main" id="{DC20CC1C-0923-4C36-AF2A-AC80AEF6A378}"/>
+              </a:ext>
+            </a:extLst>
+          </p:cNvPr>
+          <p:cNvSpPr>
+            <a:spLocks noGrp="1"/>
+          </p:cNvSpPr>
+          <p:nvPr>
+            <p:ph type="title"/>
+          </p:nvPr>
+        </p:nvSpPr>
+        <p:spPr/>
+        <p:txBody>
+          <a:bodyPr/>
+          <a:lstStyle/>
+          <a:p>
+            <a:r>
+              <a:rPr lang="en-GB" dirty="0"/>
+              <a:t>Fruitful Choice</a:t>
+            </a:r>
+          </a:p>
+        </p:txBody>
+      </p:sp>
+      <p:pic>
+        <p:nvPicPr>
+          <p:cNvPr id="6" name="Content Placeholder 5">
+            <a:extLst>
+              <a:ext uri="{FF2B5EF4-FFF2-40B4-BE49-F238E27FC236}">
+                <a16:creationId xmlns:a16="http://schemas.microsoft.com/office/drawing/2014/main" id="{A95DC7A4-D5AD-437E-B6A3-2C774C243694}"/>
+              </a:ext>
+            </a:extLst>
+          </p:cNvPr>
+          <p:cNvPicPr>
+            <a:picLocks noGrp="1" noChangeAspect="1"/>
+          </p:cNvPicPr>
+          <p:nvPr>
+            <p:ph idx="1"/>
+          </p:nvPr>
+        </p:nvPicPr>
+        <p:blipFill>
+          <a:blip r:embed="rId2">
+            <a:extLst>
+              <a:ext uri="{28A0092B-C50C-407E-A947-70E740481C1C}">
+                <a14:useLocalDpi xmlns:a14="http://schemas.microsoft.com/office/drawing/2010/main" val="0"/>
+              </a:ext>
+            </a:extLst>
+          </a:blip>
+          <a:stretch>
+            <a:fillRect/>
+          </a:stretch>
+        </p:blipFill>
+        <p:spPr>
+          <a:xfrm>
+            <a:off x="2818371" y="5302685"/>
+            <a:ext cx="7229025" cy="3636963"/>
+          </a:xfrm>
+        </p:spPr>
+      </p:pic>
+      <p:pic>
+        <p:nvPicPr>
+          <p:cNvPr id="4" name="Picture 3">
+            <a:extLst>
+              <a:ext uri="{FF2B5EF4-FFF2-40B4-BE49-F238E27FC236}">
+                <a16:creationId xmlns:a16="http://schemas.microsoft.com/office/drawing/2014/main" id="{91492980-55E8-4D27-9B81-C79295572738}"/>
+              </a:ext>
+            </a:extLst>
+          </p:cNvPr>
+          <p:cNvPicPr>
+            <a:picLocks noChangeAspect="1"/>
+          </p:cNvPicPr>
+          <p:nvPr/>
+        </p:nvPicPr>
+        <p:blipFill>
+          <a:blip r:embed="rId3"/>
+          <a:stretch>
+            <a:fillRect/>
+          </a:stretch>
+        </p:blipFill>
+        <p:spPr>
+          <a:xfrm>
+            <a:off x="2029307" y="2561095"/>
+            <a:ext cx="8133384" cy="2741590"/>
+          </a:xfrm>
+          <a:prstGeom prst="rect">
+            <a:avLst/>
+          </a:prstGeom>
+        </p:spPr>
+      </p:pic>
+    </p:spTree>
+    <p:extLst>
+      <p:ext uri="{BB962C8B-B14F-4D97-AF65-F5344CB8AC3E}">
+        <p14:creationId xmlns:p14="http://schemas.microsoft.com/office/powerpoint/2010/main" val="1391785033"/>
+      </p:ext>
+    </p:extLst>
+  </p:cSld>
+  <p:clrMapOvr>
+    <a:masterClrMapping/>
+  </p:clrMapOvr>
+</p:sld>
+</file>
+
+<file path=ppt/slides/slide15.xml><?xml version="1.0" encoding="utf-8"?>
+<p:sld xmlns:a="http://schemas.openxmlformats.org/drawingml/2006/main" xmlns:r="http://schemas.openxmlformats.org/officeDocument/2006/relationships" xmlns:p="http://schemas.openxmlformats.org/presentationml/2006/main">
+  <p:cSld>
+    <p:spTree>
+      <p:nvGrpSpPr>
+        <p:cNvPr id="1" name=""/>
+        <p:cNvGrpSpPr/>
+        <p:nvPr/>
+      </p:nvGrpSpPr>
+      <p:grpSpPr>
+        <a:xfrm>
+          <a:off x="0" y="0"/>
+          <a:ext cx="0" cy="0"/>
+          <a:chOff x="0" y="0"/>
+          <a:chExt cx="0" cy="0"/>
+        </a:xfrm>
+      </p:grpSpPr>
+      <p:sp>
+        <p:nvSpPr>
+          <p:cNvPr id="2" name="Title 1">
+            <a:extLst>
+              <a:ext uri="{FF2B5EF4-FFF2-40B4-BE49-F238E27FC236}">
                 <a16:creationId xmlns:a16="http://schemas.microsoft.com/office/drawing/2014/main" id="{DFF4C426-0631-47E4-BC21-E759BB2BC85F}"/>
               </a:ext>
             </a:extLst>
@@ -6087,7 +6222,7 @@
 </p:sld>
 </file>
 
-<file path=ppt/slides/slide15.xml><?xml version="1.0" encoding="utf-8"?>
+<file path=ppt/slides/slide16.xml><?xml version="1.0" encoding="utf-8"?>
 <p:sld xmlns:a="http://schemas.openxmlformats.org/drawingml/2006/main" xmlns:r="http://schemas.openxmlformats.org/officeDocument/2006/relationships" xmlns:p="http://schemas.openxmlformats.org/presentationml/2006/main">
   <p:cSld>
     <p:spTree>
@@ -6234,6 +6369,86 @@
 </p:sld>
 </file>
 
+<file path=ppt/slides/slide17.xml><?xml version="1.0" encoding="utf-8"?>
+<p:sld xmlns:a="http://schemas.openxmlformats.org/drawingml/2006/main" xmlns:r="http://schemas.openxmlformats.org/officeDocument/2006/relationships" xmlns:p="http://schemas.openxmlformats.org/presentationml/2006/main">
+  <p:cSld>
+    <p:spTree>
+      <p:nvGrpSpPr>
+        <p:cNvPr id="1" name=""/>
+        <p:cNvGrpSpPr/>
+        <p:nvPr/>
+      </p:nvGrpSpPr>
+      <p:grpSpPr>
+        <a:xfrm>
+          <a:off x="0" y="0"/>
+          <a:ext cx="0" cy="0"/>
+          <a:chOff x="0" y="0"/>
+          <a:chExt cx="0" cy="0"/>
+        </a:xfrm>
+      </p:grpSpPr>
+      <p:sp>
+        <p:nvSpPr>
+          <p:cNvPr id="2" name="Title 1">
+            <a:extLst>
+              <a:ext uri="{FF2B5EF4-FFF2-40B4-BE49-F238E27FC236}">
+                <a16:creationId xmlns:a16="http://schemas.microsoft.com/office/drawing/2014/main" id="{212787D5-941E-4C0C-8918-D53148EC51C3}"/>
+              </a:ext>
+            </a:extLst>
+          </p:cNvPr>
+          <p:cNvSpPr>
+            <a:spLocks noGrp="1"/>
+          </p:cNvSpPr>
+          <p:nvPr>
+            <p:ph type="title"/>
+          </p:nvPr>
+        </p:nvSpPr>
+        <p:spPr/>
+        <p:txBody>
+          <a:bodyPr/>
+          <a:lstStyle/>
+          <a:p>
+            <a:endParaRPr lang="en-GB" dirty="0"/>
+          </a:p>
+        </p:txBody>
+      </p:sp>
+      <p:sp>
+        <p:nvSpPr>
+          <p:cNvPr id="3" name="Content Placeholder 2">
+            <a:extLst>
+              <a:ext uri="{FF2B5EF4-FFF2-40B4-BE49-F238E27FC236}">
+                <a16:creationId xmlns:a16="http://schemas.microsoft.com/office/drawing/2014/main" id="{BCC2BE5F-894C-4A9C-B3BD-35A3F82C010B}"/>
+              </a:ext>
+            </a:extLst>
+          </p:cNvPr>
+          <p:cNvSpPr>
+            <a:spLocks noGrp="1"/>
+          </p:cNvSpPr>
+          <p:nvPr>
+            <p:ph idx="1"/>
+          </p:nvPr>
+        </p:nvSpPr>
+        <p:spPr/>
+        <p:txBody>
+          <a:bodyPr/>
+          <a:lstStyle/>
+          <a:p>
+            <a:endParaRPr lang="en-GB"/>
+          </a:p>
+        </p:txBody>
+      </p:sp>
+    </p:spTree>
+    <p:extLst>
+      <p:ext uri="{BB962C8B-B14F-4D97-AF65-F5344CB8AC3E}">
+        <p14:creationId xmlns:p14="http://schemas.microsoft.com/office/powerpoint/2010/main" val="3021442457"/>
+      </p:ext>
+    </p:extLst>
+  </p:cSld>
+  <p:clrMapOvr>
+    <a:masterClrMapping/>
+  </p:clrMapOvr>
+</p:sld>
+</file>
+
 <file path=ppt/slides/slide2.xml><?xml version="1.0" encoding="utf-8"?>
 <p:sld xmlns:a="http://schemas.openxmlformats.org/drawingml/2006/main" xmlns:r="http://schemas.openxmlformats.org/officeDocument/2006/relationships" xmlns:p="http://schemas.openxmlformats.org/presentationml/2006/main">
   <p:cSld>
@@ -6310,7 +6525,7 @@
           <a:p>
             <a:r>
               <a:rPr lang="en-GB" sz="2800" b="1" dirty="0"/>
-              <a:t>Easy fun with focus on relaxation</a:t>
+              <a:t>Easy fun with focus on relaxation and nurturing behaviour</a:t>
             </a:r>
           </a:p>
           <a:p>
@@ -6366,21 +6581,170 @@
         </p:nvSpPr>
         <p:spPr/>
         <p:txBody>
+          <a:bodyPr/>
+          <a:lstStyle/>
+          <a:p>
+            <a:r>
+              <a:rPr lang="en-GB" dirty="0"/>
+              <a:t>Psychographic					</a:t>
+            </a:r>
+          </a:p>
+        </p:txBody>
+      </p:sp>
+      <p:sp>
+        <p:nvSpPr>
+          <p:cNvPr id="3" name="Content Placeholder 2"/>
+          <p:cNvSpPr>
+            <a:spLocks noGrp="1"/>
+          </p:cNvSpPr>
+          <p:nvPr>
+            <p:ph idx="1"/>
+          </p:nvPr>
+        </p:nvSpPr>
+        <p:spPr/>
+        <p:txBody>
           <a:bodyPr>
             <a:normAutofit/>
           </a:bodyPr>
           <a:lstStyle/>
           <a:p>
             <a:r>
+              <a:rPr lang="en-GB" sz="2800" b="1" dirty="0"/>
+              <a:t>Sally</a:t>
+            </a:r>
+          </a:p>
+          <a:p>
+            <a:r>
+              <a:rPr lang="en-GB" sz="2800" b="1" dirty="0"/>
+              <a:t>Aged 14</a:t>
+            </a:r>
+          </a:p>
+          <a:p>
+            <a:r>
+              <a:rPr lang="en-GB" sz="2800" b="1" dirty="0"/>
+              <a:t>Female</a:t>
+            </a:r>
+          </a:p>
+          <a:p>
+            <a:r>
+              <a:rPr lang="en-GB" sz="2800" b="1" dirty="0"/>
+              <a:t>Grade 2 in Clarinet</a:t>
+            </a:r>
+          </a:p>
+          <a:p>
+            <a:r>
+              <a:rPr lang="en-GB" sz="2800" b="1" dirty="0"/>
+              <a:t>She lives with her Mum                                                                       and two siblings</a:t>
+            </a:r>
+          </a:p>
+        </p:txBody>
+      </p:sp>
+      <p:pic>
+        <p:nvPicPr>
+          <p:cNvPr id="5" name="Picture 4" descr="Image result for teenage girl">
+            <a:extLst>
+              <a:ext uri="{FF2B5EF4-FFF2-40B4-BE49-F238E27FC236}">
+                <a16:creationId xmlns:a16="http://schemas.microsoft.com/office/drawing/2014/main" id="{FAE3AC04-ED43-4852-8329-3177B45C65F3}"/>
+              </a:ext>
+            </a:extLst>
+          </p:cNvPr>
+          <p:cNvPicPr/>
+          <p:nvPr/>
+        </p:nvPicPr>
+        <p:blipFill>
+          <a:blip r:embed="rId2" cstate="print">
+            <a:extLst>
+              <a:ext uri="{28A0092B-C50C-407E-A947-70E740481C1C}">
+                <a14:useLocalDpi xmlns:a14="http://schemas.microsoft.com/office/drawing/2010/main" val="0"/>
+              </a:ext>
+            </a:extLst>
+          </a:blip>
+          <a:srcRect/>
+          <a:stretch>
+            <a:fillRect/>
+          </a:stretch>
+        </p:blipFill>
+        <p:spPr bwMode="auto">
+          <a:xfrm>
+            <a:off x="6278729" y="2396290"/>
+            <a:ext cx="4948251" cy="3636510"/>
+          </a:xfrm>
+          <a:prstGeom prst="rect">
+            <a:avLst/>
+          </a:prstGeom>
+          <a:noFill/>
+          <a:ln>
+            <a:noFill/>
+          </a:ln>
+        </p:spPr>
+      </p:pic>
+    </p:spTree>
+    <p:extLst>
+      <p:ext uri="{BB962C8B-B14F-4D97-AF65-F5344CB8AC3E}">
+        <p14:creationId xmlns:p14="http://schemas.microsoft.com/office/powerpoint/2010/main" val="3912300086"/>
+      </p:ext>
+    </p:extLst>
+  </p:cSld>
+  <p:clrMapOvr>
+    <a:masterClrMapping/>
+  </p:clrMapOvr>
+</p:sld>
+</file>
+
+<file path=ppt/slides/slide4.xml><?xml version="1.0" encoding="utf-8"?>
+<p:sld xmlns:a="http://schemas.openxmlformats.org/drawingml/2006/main" xmlns:r="http://schemas.openxmlformats.org/officeDocument/2006/relationships" xmlns:p="http://schemas.openxmlformats.org/presentationml/2006/main">
+  <p:cSld>
+    <p:spTree>
+      <p:nvGrpSpPr>
+        <p:cNvPr id="1" name=""/>
+        <p:cNvGrpSpPr/>
+        <p:nvPr/>
+      </p:nvGrpSpPr>
+      <p:grpSpPr>
+        <a:xfrm>
+          <a:off x="0" y="0"/>
+          <a:ext cx="0" cy="0"/>
+          <a:chOff x="0" y="0"/>
+          <a:chExt cx="0" cy="0"/>
+        </a:xfrm>
+      </p:grpSpPr>
+      <p:sp>
+        <p:nvSpPr>
+          <p:cNvPr id="2" name="Title 1">
+            <a:extLst>
+              <a:ext uri="{FF2B5EF4-FFF2-40B4-BE49-F238E27FC236}">
+                <a16:creationId xmlns:a16="http://schemas.microsoft.com/office/drawing/2014/main" id="{1FAA4FEA-F1D5-4A74-8425-E9578209FD92}"/>
+              </a:ext>
+            </a:extLst>
+          </p:cNvPr>
+          <p:cNvSpPr>
+            <a:spLocks noGrp="1"/>
+          </p:cNvSpPr>
+          <p:nvPr>
+            <p:ph type="title"/>
+          </p:nvPr>
+        </p:nvSpPr>
+        <p:spPr/>
+        <p:txBody>
+          <a:bodyPr/>
+          <a:lstStyle/>
+          <a:p>
+            <a:r>
               <a:rPr lang="en-GB" dirty="0"/>
-              <a:t>Gaia</a:t>
-            </a:r>
-          </a:p>
-        </p:txBody>
-      </p:sp>
-      <p:sp>
-        <p:nvSpPr>
-          <p:cNvPr id="3" name="Content Placeholder 2"/>
+              <a:t>Sound and Colour choice</a:t>
+            </a:r>
+          </a:p>
+        </p:txBody>
+      </p:sp>
+      <p:sp>
+        <p:nvSpPr>
+          <p:cNvPr id="3" name="Content Placeholder 2">
+            <a:extLst>
+              <a:ext uri="{FF2B5EF4-FFF2-40B4-BE49-F238E27FC236}">
+                <a16:creationId xmlns:a16="http://schemas.microsoft.com/office/drawing/2014/main" id="{BC5084AC-0BD0-415C-8671-FBB0515DC32F}"/>
+              </a:ext>
+            </a:extLst>
+          </p:cNvPr>
           <p:cNvSpPr>
             <a:spLocks noGrp="1"/>
           </p:cNvSpPr>
@@ -6397,14 +6761,120 @@
           <a:p>
             <a:r>
               <a:rPr lang="en-GB" sz="2800" b="1" dirty="0"/>
-              <a:t>Here’s the previous version:</a:t>
-            </a:r>
-          </a:p>
-          <a:p>
+              <a:t>According to Yousuf </a:t>
+            </a:r>
+            <a:r>
+              <a:rPr lang="en-GB" sz="2800" b="1" dirty="0" err="1"/>
+              <a:t>Azeemi</a:t>
+            </a:r>
             <a:r>
               <a:rPr lang="en-GB" sz="2800" b="1" dirty="0"/>
-              <a:t>Here’s the latest version:</a:t>
-            </a:r>
+              <a:t>, S and Mohsin Raza, S (2005), Pink is used in Chromotherapy to relax (specifically used in Prison Populations) and Blue is used to induce calmness.</a:t>
+            </a:r>
+          </a:p>
+          <a:p>
+            <a:r>
+              <a:rPr lang="en-GB" sz="2800" b="1" dirty="0"/>
+              <a:t>The music being produced uses mostly string instruments and soft air instruments. </a:t>
+            </a:r>
+          </a:p>
+        </p:txBody>
+      </p:sp>
+    </p:spTree>
+    <p:extLst>
+      <p:ext uri="{BB962C8B-B14F-4D97-AF65-F5344CB8AC3E}">
+        <p14:creationId xmlns:p14="http://schemas.microsoft.com/office/powerpoint/2010/main" val="2267587696"/>
+      </p:ext>
+    </p:extLst>
+  </p:cSld>
+  <p:clrMapOvr>
+    <a:masterClrMapping/>
+  </p:clrMapOvr>
+</p:sld>
+</file>
+
+<file path=ppt/slides/slide5.xml><?xml version="1.0" encoding="utf-8"?>
+<p:sld xmlns:a="http://schemas.openxmlformats.org/drawingml/2006/main" xmlns:r="http://schemas.openxmlformats.org/officeDocument/2006/relationships" xmlns:p="http://schemas.openxmlformats.org/presentationml/2006/main">
+  <p:cSld>
+    <p:spTree>
+      <p:nvGrpSpPr>
+        <p:cNvPr id="1" name=""/>
+        <p:cNvGrpSpPr/>
+        <p:nvPr/>
+      </p:nvGrpSpPr>
+      <p:grpSpPr>
+        <a:xfrm>
+          <a:off x="0" y="0"/>
+          <a:ext cx="0" cy="0"/>
+          <a:chOff x="0" y="0"/>
+          <a:chExt cx="0" cy="0"/>
+        </a:xfrm>
+      </p:grpSpPr>
+      <p:sp>
+        <p:nvSpPr>
+          <p:cNvPr id="2" name="Title 1"/>
+          <p:cNvSpPr>
+            <a:spLocks noGrp="1"/>
+          </p:cNvSpPr>
+          <p:nvPr>
+            <p:ph type="title"/>
+          </p:nvPr>
+        </p:nvSpPr>
+        <p:spPr/>
+        <p:txBody>
+          <a:bodyPr>
+            <a:normAutofit/>
+          </a:bodyPr>
+          <a:lstStyle/>
+          <a:p>
+            <a:r>
+              <a:rPr lang="en-GB" dirty="0"/>
+              <a:t>Gaia</a:t>
+            </a:r>
+          </a:p>
+        </p:txBody>
+      </p:sp>
+      <p:sp>
+        <p:nvSpPr>
+          <p:cNvPr id="3" name="Content Placeholder 2"/>
+          <p:cNvSpPr>
+            <a:spLocks noGrp="1"/>
+          </p:cNvSpPr>
+          <p:nvPr>
+            <p:ph idx="1"/>
+          </p:nvPr>
+        </p:nvSpPr>
+        <p:spPr/>
+        <p:txBody>
+          <a:bodyPr>
+            <a:normAutofit/>
+          </a:bodyPr>
+          <a:lstStyle/>
+          <a:p>
+            <a:r>
+              <a:rPr lang="en-GB" sz="2800" b="1" dirty="0"/>
+              <a:t>Here’s the previous version: </a:t>
+            </a:r>
+            <a:r>
+              <a:rPr lang="en-GB" sz="2800" b="1" dirty="0">
+                <a:hlinkClick r:id="rId2"/>
+              </a:rPr>
+              <a:t>https://www.youtube.com/watch?v=rhv1c4Z93j4&amp;feature=youtu.be</a:t>
+            </a:r>
+            <a:endParaRPr lang="en-GB" sz="2800" b="1" dirty="0"/>
+          </a:p>
+          <a:p>
+            <a:r>
+              <a:rPr lang="en-GB" sz="2800" b="1" dirty="0"/>
+              <a:t>Here’s the latest version:         </a:t>
+            </a:r>
+            <a:r>
+              <a:rPr lang="en-GB" sz="2800" b="1" u="sng" dirty="0">
+                <a:hlinkClick r:id="rId3" tooltip="https://youtu.be/clCCnU6iQ5M"/>
+              </a:rPr>
+              <a:t>https://youtu.be/clCCnU6iQ5M</a:t>
+            </a:r>
+            <a:endParaRPr lang="en-GB" sz="2800" b="1" dirty="0"/>
           </a:p>
         </p:txBody>
       </p:sp>
@@ -6421,7 +6891,7 @@
 </p:sld>
 </file>
 
-<file path=ppt/slides/slide4.xml><?xml version="1.0" encoding="utf-8"?>
+<file path=ppt/slides/slide6.xml><?xml version="1.0" encoding="utf-8"?>
 <p:sld xmlns:a="http://schemas.openxmlformats.org/drawingml/2006/main" xmlns:r="http://schemas.openxmlformats.org/officeDocument/2006/relationships" xmlns:p="http://schemas.openxmlformats.org/presentationml/2006/main">
   <p:cSld>
     <p:spTree>
@@ -7081,233 +7551,6 @@
 </p:sld>
 </file>
 
-<file path=ppt/slides/slide5.xml><?xml version="1.0" encoding="utf-8"?>
-<p:sld xmlns:a="http://schemas.openxmlformats.org/drawingml/2006/main" xmlns:r="http://schemas.openxmlformats.org/officeDocument/2006/relationships" xmlns:p="http://schemas.openxmlformats.org/presentationml/2006/main">
-  <p:cSld>
-    <p:spTree>
-      <p:nvGrpSpPr>
-        <p:cNvPr id="1" name=""/>
-        <p:cNvGrpSpPr/>
-        <p:nvPr/>
-      </p:nvGrpSpPr>
-      <p:grpSpPr>
-        <a:xfrm>
-          <a:off x="0" y="0"/>
-          <a:ext cx="0" cy="0"/>
-          <a:chOff x="0" y="0"/>
-          <a:chExt cx="0" cy="0"/>
-        </a:xfrm>
-      </p:grpSpPr>
-      <p:sp>
-        <p:nvSpPr>
-          <p:cNvPr id="2" name="Title 1"/>
-          <p:cNvSpPr>
-            <a:spLocks noGrp="1"/>
-          </p:cNvSpPr>
-          <p:nvPr>
-            <p:ph type="title"/>
-          </p:nvPr>
-        </p:nvSpPr>
-        <p:spPr/>
-        <p:txBody>
-          <a:bodyPr/>
-          <a:lstStyle/>
-          <a:p>
-            <a:r>
-              <a:rPr lang="en-GB" dirty="0"/>
-              <a:t>Target Demographic					</a:t>
-            </a:r>
-          </a:p>
-        </p:txBody>
-      </p:sp>
-      <p:sp>
-        <p:nvSpPr>
-          <p:cNvPr id="3" name="Content Placeholder 2"/>
-          <p:cNvSpPr>
-            <a:spLocks noGrp="1"/>
-          </p:cNvSpPr>
-          <p:nvPr>
-            <p:ph idx="1"/>
-          </p:nvPr>
-        </p:nvSpPr>
-        <p:spPr/>
-        <p:txBody>
-          <a:bodyPr>
-            <a:normAutofit/>
-          </a:bodyPr>
-          <a:lstStyle/>
-          <a:p>
-            <a:r>
-              <a:rPr lang="en-GB" sz="2800" b="1" dirty="0"/>
-              <a:t>Females</a:t>
-            </a:r>
-          </a:p>
-          <a:p>
-            <a:r>
-              <a:rPr lang="en-GB" sz="2800" b="1" dirty="0"/>
-              <a:t>Aged 7+</a:t>
-            </a:r>
-          </a:p>
-          <a:p>
-            <a:r>
-              <a:rPr lang="en-GB" sz="2800" b="1" dirty="0"/>
-              <a:t>Nurturing Behaviour</a:t>
-            </a:r>
-          </a:p>
-          <a:p>
-            <a:r>
-              <a:rPr lang="en-GB" sz="2800" b="1" dirty="0"/>
-              <a:t>Relaxed Sensation</a:t>
-            </a:r>
-          </a:p>
-        </p:txBody>
-      </p:sp>
-      <p:pic>
-        <p:nvPicPr>
-          <p:cNvPr id="6" name="Picture 5">
-            <a:extLst>
-              <a:ext uri="{FF2B5EF4-FFF2-40B4-BE49-F238E27FC236}">
-                <a16:creationId xmlns:a16="http://schemas.microsoft.com/office/drawing/2014/main" id="{73E4781B-22D5-4228-87E8-8B4C9A7AF19A}"/>
-              </a:ext>
-            </a:extLst>
-          </p:cNvPr>
-          <p:cNvPicPr>
-            <a:picLocks noChangeAspect="1"/>
-          </p:cNvPicPr>
-          <p:nvPr/>
-        </p:nvPicPr>
-        <p:blipFill>
-          <a:blip r:embed="rId2">
-            <a:extLst>
-              <a:ext uri="{28A0092B-C50C-407E-A947-70E740481C1C}">
-                <a14:useLocalDpi xmlns:a14="http://schemas.microsoft.com/office/drawing/2010/main" val="0"/>
-              </a:ext>
-            </a:extLst>
-          </a:blip>
-          <a:stretch>
-            <a:fillRect/>
-          </a:stretch>
-        </p:blipFill>
-        <p:spPr>
-          <a:xfrm>
-            <a:off x="5285998" y="2429798"/>
-            <a:ext cx="6096000" cy="3429000"/>
-          </a:xfrm>
-          <a:prstGeom prst="rect">
-            <a:avLst/>
-          </a:prstGeom>
-        </p:spPr>
-      </p:pic>
-    </p:spTree>
-    <p:extLst>
-      <p:ext uri="{BB962C8B-B14F-4D97-AF65-F5344CB8AC3E}">
-        <p14:creationId xmlns:p14="http://schemas.microsoft.com/office/powerpoint/2010/main" val="3912300086"/>
-      </p:ext>
-    </p:extLst>
-  </p:cSld>
-  <p:clrMapOvr>
-    <a:masterClrMapping/>
-  </p:clrMapOvr>
-</p:sld>
-</file>
-
-<file path=ppt/slides/slide6.xml><?xml version="1.0" encoding="utf-8"?>
-<p:sld xmlns:a="http://schemas.openxmlformats.org/drawingml/2006/main" xmlns:r="http://schemas.openxmlformats.org/officeDocument/2006/relationships" xmlns:p="http://schemas.openxmlformats.org/presentationml/2006/main">
-  <p:cSld>
-    <p:spTree>
-      <p:nvGrpSpPr>
-        <p:cNvPr id="1" name=""/>
-        <p:cNvGrpSpPr/>
-        <p:nvPr/>
-      </p:nvGrpSpPr>
-      <p:grpSpPr>
-        <a:xfrm>
-          <a:off x="0" y="0"/>
-          <a:ext cx="0" cy="0"/>
-          <a:chOff x="0" y="0"/>
-          <a:chExt cx="0" cy="0"/>
-        </a:xfrm>
-      </p:grpSpPr>
-      <p:sp>
-        <p:nvSpPr>
-          <p:cNvPr id="2" name="Title 1">
-            <a:extLst>
-              <a:ext uri="{FF2B5EF4-FFF2-40B4-BE49-F238E27FC236}">
-                <a16:creationId xmlns:a16="http://schemas.microsoft.com/office/drawing/2014/main" id="{1754947A-5FAA-4FDD-9128-C5F2DA7F9A9B}"/>
-              </a:ext>
-            </a:extLst>
-          </p:cNvPr>
-          <p:cNvSpPr>
-            <a:spLocks noGrp="1"/>
-          </p:cNvSpPr>
-          <p:nvPr>
-            <p:ph type="title"/>
-          </p:nvPr>
-        </p:nvSpPr>
-        <p:spPr/>
-        <p:txBody>
-          <a:bodyPr/>
-          <a:lstStyle/>
-          <a:p>
-            <a:r>
-              <a:rPr lang="en-GB" dirty="0"/>
-              <a:t>What is nurturing?</a:t>
-            </a:r>
-          </a:p>
-        </p:txBody>
-      </p:sp>
-      <p:sp>
-        <p:nvSpPr>
-          <p:cNvPr id="7" name="Content Placeholder 6">
-            <a:extLst>
-              <a:ext uri="{FF2B5EF4-FFF2-40B4-BE49-F238E27FC236}">
-                <a16:creationId xmlns:a16="http://schemas.microsoft.com/office/drawing/2014/main" id="{960AC20B-727B-4CCA-8651-CCDA720492D1}"/>
-              </a:ext>
-            </a:extLst>
-          </p:cNvPr>
-          <p:cNvSpPr>
-            <a:spLocks noGrp="1"/>
-          </p:cNvSpPr>
-          <p:nvPr>
-            <p:ph idx="1"/>
-          </p:nvPr>
-        </p:nvSpPr>
-        <p:spPr/>
-        <p:txBody>
-          <a:bodyPr>
-            <a:normAutofit/>
-          </a:bodyPr>
-          <a:lstStyle/>
-          <a:p>
-            <a:r>
-              <a:rPr lang="en-GB" sz="2800" b="1" dirty="0"/>
-              <a:t>Attachment behaviour has the outcome of increasing proximity of the child to the attachment figure. Some attachment behaviours (smiling/vocalising) make mothers feel the need to nurture their child to ensure survival.</a:t>
-            </a:r>
-          </a:p>
-          <a:p>
-            <a:pPr marL="0" indent="0" algn="r">
-              <a:buNone/>
-            </a:pPr>
-            <a:r>
-              <a:rPr lang="en-GB" sz="2800" b="1" dirty="0"/>
-              <a:t>-Bowlby’s Evolutionary Attachment Theory, 1969</a:t>
-            </a:r>
-          </a:p>
-        </p:txBody>
-      </p:sp>
-    </p:spTree>
-    <p:extLst>
-      <p:ext uri="{BB962C8B-B14F-4D97-AF65-F5344CB8AC3E}">
-        <p14:creationId xmlns:p14="http://schemas.microsoft.com/office/powerpoint/2010/main" val="3636051642"/>
-      </p:ext>
-    </p:extLst>
-  </p:cSld>
-  <p:clrMapOvr>
-    <a:masterClrMapping/>
-  </p:clrMapOvr>
-</p:sld>
-</file>
-
 <file path=ppt/slides/slide7.xml><?xml version="1.0" encoding="utf-8"?>
 <p:sld xmlns:a="http://schemas.openxmlformats.org/drawingml/2006/main" xmlns:r="http://schemas.openxmlformats.org/officeDocument/2006/relationships" xmlns:p="http://schemas.openxmlformats.org/presentationml/2006/main">
   <p:cSld>
@@ -7330,6 +7573,103 @@
           <p:cNvPr id="2" name="Title 1">
             <a:extLst>
               <a:ext uri="{FF2B5EF4-FFF2-40B4-BE49-F238E27FC236}">
+                <a16:creationId xmlns:a16="http://schemas.microsoft.com/office/drawing/2014/main" id="{1754947A-5FAA-4FDD-9128-C5F2DA7F9A9B}"/>
+              </a:ext>
+            </a:extLst>
+          </p:cNvPr>
+          <p:cNvSpPr>
+            <a:spLocks noGrp="1"/>
+          </p:cNvSpPr>
+          <p:nvPr>
+            <p:ph type="title"/>
+          </p:nvPr>
+        </p:nvSpPr>
+        <p:spPr/>
+        <p:txBody>
+          <a:bodyPr/>
+          <a:lstStyle/>
+          <a:p>
+            <a:r>
+              <a:rPr lang="en-GB" dirty="0"/>
+              <a:t>How do we encourage nurturing?</a:t>
+            </a:r>
+          </a:p>
+        </p:txBody>
+      </p:sp>
+      <p:sp>
+        <p:nvSpPr>
+          <p:cNvPr id="7" name="Content Placeholder 6">
+            <a:extLst>
+              <a:ext uri="{FF2B5EF4-FFF2-40B4-BE49-F238E27FC236}">
+                <a16:creationId xmlns:a16="http://schemas.microsoft.com/office/drawing/2014/main" id="{960AC20B-727B-4CCA-8651-CCDA720492D1}"/>
+              </a:ext>
+            </a:extLst>
+          </p:cNvPr>
+          <p:cNvSpPr>
+            <a:spLocks noGrp="1"/>
+          </p:cNvSpPr>
+          <p:nvPr>
+            <p:ph idx="1"/>
+          </p:nvPr>
+        </p:nvSpPr>
+        <p:spPr/>
+        <p:txBody>
+          <a:bodyPr>
+            <a:normAutofit/>
+          </a:bodyPr>
+          <a:lstStyle/>
+          <a:p>
+            <a:r>
+              <a:rPr lang="en-GB" sz="2800" b="1" dirty="0"/>
+              <a:t>Attachment behaviour has the outcome of increasing proximity of the child to the attachment figure. Some attachment behaviours (smiling/vocalising) make mothers feel the need to nurture their child to ensure survival.</a:t>
+            </a:r>
+          </a:p>
+          <a:p>
+            <a:pPr marL="0" indent="0" algn="r">
+              <a:buNone/>
+            </a:pPr>
+            <a:r>
+              <a:rPr lang="en-GB" sz="2800" b="1" dirty="0"/>
+              <a:t>-Bowlby’s Evolutionary Attachment Theory, 1969</a:t>
+            </a:r>
+          </a:p>
+        </p:txBody>
+      </p:sp>
+    </p:spTree>
+    <p:extLst>
+      <p:ext uri="{BB962C8B-B14F-4D97-AF65-F5344CB8AC3E}">
+        <p14:creationId xmlns:p14="http://schemas.microsoft.com/office/powerpoint/2010/main" val="3636051642"/>
+      </p:ext>
+    </p:extLst>
+  </p:cSld>
+  <p:clrMapOvr>
+    <a:masterClrMapping/>
+  </p:clrMapOvr>
+</p:sld>
+</file>
+
+<file path=ppt/slides/slide8.xml><?xml version="1.0" encoding="utf-8"?>
+<p:sld xmlns:a="http://schemas.openxmlformats.org/drawingml/2006/main" xmlns:r="http://schemas.openxmlformats.org/officeDocument/2006/relationships" xmlns:p="http://schemas.openxmlformats.org/presentationml/2006/main">
+  <p:cSld>
+    <p:spTree>
+      <p:nvGrpSpPr>
+        <p:cNvPr id="1" name=""/>
+        <p:cNvGrpSpPr/>
+        <p:nvPr/>
+      </p:nvGrpSpPr>
+      <p:grpSpPr>
+        <a:xfrm>
+          <a:off x="0" y="0"/>
+          <a:ext cx="0" cy="0"/>
+          <a:chOff x="0" y="0"/>
+          <a:chExt cx="0" cy="0"/>
+        </a:xfrm>
+      </p:grpSpPr>
+      <p:sp>
+        <p:nvSpPr>
+          <p:cNvPr id="2" name="Title 1">
+            <a:extLst>
+              <a:ext uri="{FF2B5EF4-FFF2-40B4-BE49-F238E27FC236}">
                 <a16:creationId xmlns:a16="http://schemas.microsoft.com/office/drawing/2014/main" id="{3B0AE2C7-A8C7-42A7-9C44-105FC9794DF9}"/>
               </a:ext>
             </a:extLst>
@@ -7418,7 +7758,7 @@
 </p:sld>
 </file>
 
-<file path=ppt/slides/slide8.xml><?xml version="1.0" encoding="utf-8"?>
+<file path=ppt/slides/slide9.xml><?xml version="1.0" encoding="utf-8"?>
 <p:sld xmlns:a="http://schemas.openxmlformats.org/drawingml/2006/main" xmlns:r="http://schemas.openxmlformats.org/officeDocument/2006/relationships" xmlns:p="http://schemas.openxmlformats.org/presentationml/2006/main">
   <p:cSld>
     <p:spTree>
@@ -7619,133 +7959,10 @@
 </p:sld>
 </file>
 
-<file path=ppt/slides/slide9.xml><?xml version="1.0" encoding="utf-8"?>
-<p:sld xmlns:a="http://schemas.openxmlformats.org/drawingml/2006/main" xmlns:r="http://schemas.openxmlformats.org/officeDocument/2006/relationships" xmlns:p="http://schemas.openxmlformats.org/presentationml/2006/main">
-  <p:cSld>
-    <p:spTree>
-      <p:nvGrpSpPr>
-        <p:cNvPr id="1" name=""/>
-        <p:cNvGrpSpPr/>
-        <p:nvPr/>
-      </p:nvGrpSpPr>
-      <p:grpSpPr>
-        <a:xfrm>
-          <a:off x="0" y="0"/>
-          <a:ext cx="0" cy="0"/>
-          <a:chOff x="0" y="0"/>
-          <a:chExt cx="0" cy="0"/>
-        </a:xfrm>
-      </p:grpSpPr>
-      <p:sp>
-        <p:nvSpPr>
-          <p:cNvPr id="2" name="Title 1">
-            <a:extLst>
-              <a:ext uri="{FF2B5EF4-FFF2-40B4-BE49-F238E27FC236}">
-                <a16:creationId xmlns:a16="http://schemas.microsoft.com/office/drawing/2014/main" id="{4E6D46AD-2146-4D3E-93C5-CA4A3AC61AB3}"/>
-              </a:ext>
-            </a:extLst>
-          </p:cNvPr>
-          <p:cNvSpPr>
-            <a:spLocks noGrp="1"/>
-          </p:cNvSpPr>
-          <p:nvPr>
-            <p:ph type="title"/>
-          </p:nvPr>
-        </p:nvSpPr>
-        <p:spPr/>
-        <p:txBody>
-          <a:bodyPr/>
-          <a:lstStyle/>
-          <a:p>
-            <a:r>
-              <a:rPr lang="en-GB" dirty="0"/>
-              <a:t>Keeping your pet happy</a:t>
-            </a:r>
-          </a:p>
-        </p:txBody>
-      </p:sp>
-      <p:sp>
-        <p:nvSpPr>
-          <p:cNvPr id="3" name="Content Placeholder 2">
-            <a:extLst>
-              <a:ext uri="{FF2B5EF4-FFF2-40B4-BE49-F238E27FC236}">
-                <a16:creationId xmlns:a16="http://schemas.microsoft.com/office/drawing/2014/main" id="{752B7FC2-BF01-41B5-845F-65A516ADECBA}"/>
-              </a:ext>
-            </a:extLst>
-          </p:cNvPr>
-          <p:cNvSpPr>
-            <a:spLocks noGrp="1"/>
-          </p:cNvSpPr>
-          <p:nvPr>
-            <p:ph idx="1"/>
-          </p:nvPr>
-        </p:nvSpPr>
-        <p:spPr>
-          <a:xfrm>
-            <a:off x="818712" y="2486981"/>
-            <a:ext cx="10554574" cy="3636511"/>
-          </a:xfrm>
-        </p:spPr>
-        <p:txBody>
-          <a:bodyPr>
-            <a:noAutofit/>
-          </a:bodyPr>
-          <a:lstStyle/>
-          <a:p>
-            <a:r>
-              <a:rPr lang="en-GB" sz="2800" b="1" dirty="0"/>
-              <a:t>Food will never decrease mood</a:t>
-            </a:r>
-          </a:p>
-          <a:p>
-            <a:pPr lvl="1"/>
-            <a:r>
-              <a:rPr lang="en-GB" sz="2800" b="1" dirty="0"/>
-              <a:t>Favourite fruit Increases mood a lot</a:t>
-            </a:r>
-          </a:p>
-          <a:p>
-            <a:pPr lvl="1"/>
-            <a:r>
-              <a:rPr lang="en-GB" sz="2800" b="1" dirty="0"/>
-              <a:t>Non-Preference fruit increases mood a little</a:t>
-            </a:r>
-          </a:p>
-          <a:p>
-            <a:pPr lvl="1"/>
-            <a:r>
-              <a:rPr lang="en-GB" sz="2800" b="1" dirty="0"/>
-              <a:t>Disliked fruit will not increase the mood</a:t>
-            </a:r>
-          </a:p>
-          <a:p>
-            <a:endParaRPr lang="en-GB" sz="2800" b="1" dirty="0"/>
-          </a:p>
-          <a:p>
-            <a:r>
-              <a:rPr lang="en-GB" sz="2800" b="1" dirty="0"/>
-              <a:t>Plan to add interaction such as petting/brushing/playing with them</a:t>
-            </a:r>
-          </a:p>
-        </p:txBody>
-      </p:sp>
-    </p:spTree>
-    <p:extLst>
-      <p:ext uri="{BB962C8B-B14F-4D97-AF65-F5344CB8AC3E}">
-        <p14:creationId xmlns:p14="http://schemas.microsoft.com/office/powerpoint/2010/main" val="1809592591"/>
-      </p:ext>
-    </p:extLst>
-  </p:cSld>
-  <p:clrMapOvr>
-    <a:masterClrMapping/>
-  </p:clrMapOvr>
-</p:sld>
-</file>
-
 <file path=ppt/theme/theme1.xml><?xml version="1.0" encoding="utf-8"?>
 <a:theme xmlns:a="http://schemas.openxmlformats.org/drawingml/2006/main" name="Quotable">
   <a:themeElements>
-    <a:clrScheme name="Custom 1">
+    <a:clrScheme name="Custom 2">
       <a:dk1>
         <a:srgbClr val="7F7F7F"/>
       </a:dk1>
@@ -7777,7 +7994,7 @@
         <a:srgbClr val="CBA092"/>
       </a:accent6>
       <a:hlink>
-        <a:srgbClr val="AD1F1F"/>
+        <a:srgbClr val="E2A200"/>
       </a:hlink>
       <a:folHlink>
         <a:srgbClr val="FFC42F"/>

</xml_diff>